<commit_message>
add the document for regex
</commit_message>
<xml_diff>
--- a/raspberry-pi-report/RAGの検証_Gemma2_qdrant.pptx
+++ b/raspberry-pi-report/RAGの検証_Gemma2_qdrant.pptx
@@ -185,7 +185,7 @@
   <pc:docChgLst>
     <pc:chgData name="Yoshiharu Hamaguchi" userId="470e288704938fe9" providerId="LiveId" clId="{08F20566-51F3-49C8-9CDF-DEA9540ACD2F}"/>
     <pc:docChg chg="undo custSel addSld delSld modSld sldOrd">
-      <pc:chgData name="Yoshiharu Hamaguchi" userId="470e288704938fe9" providerId="LiveId" clId="{08F20566-51F3-49C8-9CDF-DEA9540ACD2F}" dt="2024-09-30T23:04:21.318" v="653" actId="255"/>
+      <pc:chgData name="Yoshiharu Hamaguchi" userId="470e288704938fe9" providerId="LiveId" clId="{08F20566-51F3-49C8-9CDF-DEA9540ACD2F}" dt="2024-10-01T13:45:52.538" v="678" actId="20577"/>
       <pc:docMkLst>
         <pc:docMk/>
       </pc:docMkLst>
@@ -764,13 +764,13 @@
         </pc:cxnChg>
       </pc:sldChg>
       <pc:sldChg chg="modSp mod">
-        <pc:chgData name="Yoshiharu Hamaguchi" userId="470e288704938fe9" providerId="LiveId" clId="{08F20566-51F3-49C8-9CDF-DEA9540ACD2F}" dt="2024-09-30T23:04:21.318" v="653" actId="255"/>
+        <pc:chgData name="Yoshiharu Hamaguchi" userId="470e288704938fe9" providerId="LiveId" clId="{08F20566-51F3-49C8-9CDF-DEA9540ACD2F}" dt="2024-10-01T13:45:52.538" v="678" actId="20577"/>
         <pc:sldMkLst>
           <pc:docMk/>
           <pc:sldMk cId="3824521246" sldId="271"/>
         </pc:sldMkLst>
         <pc:spChg chg="mod">
-          <ac:chgData name="Yoshiharu Hamaguchi" userId="470e288704938fe9" providerId="LiveId" clId="{08F20566-51F3-49C8-9CDF-DEA9540ACD2F}" dt="2024-09-30T23:04:21.318" v="653" actId="255"/>
+          <ac:chgData name="Yoshiharu Hamaguchi" userId="470e288704938fe9" providerId="LiveId" clId="{08F20566-51F3-49C8-9CDF-DEA9540ACD2F}" dt="2024-10-01T13:45:52.538" v="678" actId="20577"/>
           <ac:spMkLst>
             <pc:docMk/>
             <pc:sldMk cId="3824521246" sldId="271"/>
@@ -8725,7 +8725,7 @@
             </a:r>
             <a:r>
               <a:rPr lang="en-US" altLang="ja-JP" dirty="0"/>
-              <a:t>gemma2:2b</a:t>
+              <a:t>nomic-embed-text</a:t>
             </a:r>
             <a:r>
               <a:rPr lang="ja-JP" altLang="en-US" dirty="0"/>
@@ -8755,7 +8755,15 @@
             </a:r>
             <a:r>
               <a:rPr lang="en-US" altLang="ja-JP" sz="1600" dirty="0"/>
-              <a:t> pull gemma2:2b</a:t>
+              <a:t> pull</a:t>
+            </a:r>
+            <a:r>
+              <a:rPr lang="ja-JP" altLang="en-US" sz="1600" dirty="0"/>
+              <a:t> </a:t>
+            </a:r>
+            <a:r>
+              <a:rPr lang="en-US" altLang="ja-JP" sz="1600" dirty="0"/>
+              <a:t>nomic-embed-text</a:t>
             </a:r>
           </a:p>
           <a:p>
@@ -8787,8 +8795,12 @@
               <a:buNone/>
             </a:pPr>
             <a:r>
+              <a:rPr kumimoji="1" lang="fi-FI" altLang="ja-JP" sz="1600"/>
+              <a:t>$ docker </a:t>
+            </a:r>
+            <a:r>
               <a:rPr kumimoji="1" lang="fi-FI" altLang="ja-JP" sz="1600" dirty="0"/>
-              <a:t>$docker run –d -p 6333:6333 -p 6334:6334 -v $(pwd)/qdrant_storage:/qdrant/storage:z --name qdrant qdrant/qdrant</a:t>
+              <a:t>run –d -p 6333:6333 -p 6334:6334 -v $(pwd)/qdrant_storage:/qdrant/storage:z --name qdrant qdrant/qdrant</a:t>
             </a:r>
           </a:p>
           <a:p>

</xml_diff>